<commit_message>
Add figures to document
</commit_message>
<xml_diff>
--- a/doc/Imagens.pptx
+++ b/doc/Imagens.pptx
@@ -104,6 +104,11 @@
       </a:defRPr>
     </a:lvl9pPr>
   </p:defaultTextStyle>
+  <p:extLst>
+    <p:ext uri="{EFAFB233-063F-42B5-8137-9DF3F51BA10A}">
+      <p15:sldGuideLst xmlns:p15="http://schemas.microsoft.com/office/powerpoint/2012/main"/>
+    </p:ext>
+  </p:extLst>
 </p:presentation>
 </file>
 
@@ -254,7 +259,7 @@
           <a:p>
             <a:fld id="{6B63C24D-0847-4832-A6AF-18BDDE085E2E}" type="datetimeFigureOut">
               <a:rPr lang="pt-BR" smtClean="0"/>
-              <a:t>02/11/2018</a:t>
+              <a:t>12/11/2018</a:t>
             </a:fld>
             <a:endParaRPr lang="pt-BR"/>
           </a:p>
@@ -308,7 +313,7 @@
           <a:p>
             <a:fld id="{C8E25968-060D-4687-BDE5-A561D11795E5}" type="slidenum">
               <a:rPr lang="pt-BR" smtClean="0"/>
-              <a:t>‹nº›</a:t>
+              <a:t>‹#›</a:t>
             </a:fld>
             <a:endParaRPr lang="pt-BR"/>
           </a:p>
@@ -452,7 +457,7 @@
           <a:p>
             <a:fld id="{6B63C24D-0847-4832-A6AF-18BDDE085E2E}" type="datetimeFigureOut">
               <a:rPr lang="pt-BR" smtClean="0"/>
-              <a:t>02/11/2018</a:t>
+              <a:t>12/11/2018</a:t>
             </a:fld>
             <a:endParaRPr lang="pt-BR"/>
           </a:p>
@@ -506,7 +511,7 @@
           <a:p>
             <a:fld id="{C8E25968-060D-4687-BDE5-A561D11795E5}" type="slidenum">
               <a:rPr lang="pt-BR" smtClean="0"/>
-              <a:t>‹nº›</a:t>
+              <a:t>‹#›</a:t>
             </a:fld>
             <a:endParaRPr lang="pt-BR"/>
           </a:p>
@@ -660,7 +665,7 @@
           <a:p>
             <a:fld id="{6B63C24D-0847-4832-A6AF-18BDDE085E2E}" type="datetimeFigureOut">
               <a:rPr lang="pt-BR" smtClean="0"/>
-              <a:t>02/11/2018</a:t>
+              <a:t>12/11/2018</a:t>
             </a:fld>
             <a:endParaRPr lang="pt-BR"/>
           </a:p>
@@ -714,7 +719,7 @@
           <a:p>
             <a:fld id="{C8E25968-060D-4687-BDE5-A561D11795E5}" type="slidenum">
               <a:rPr lang="pt-BR" smtClean="0"/>
-              <a:t>‹nº›</a:t>
+              <a:t>‹#›</a:t>
             </a:fld>
             <a:endParaRPr lang="pt-BR"/>
           </a:p>
@@ -858,7 +863,7 @@
           <a:p>
             <a:fld id="{6B63C24D-0847-4832-A6AF-18BDDE085E2E}" type="datetimeFigureOut">
               <a:rPr lang="pt-BR" smtClean="0"/>
-              <a:t>02/11/2018</a:t>
+              <a:t>12/11/2018</a:t>
             </a:fld>
             <a:endParaRPr lang="pt-BR"/>
           </a:p>
@@ -912,7 +917,7 @@
           <a:p>
             <a:fld id="{C8E25968-060D-4687-BDE5-A561D11795E5}" type="slidenum">
               <a:rPr lang="pt-BR" smtClean="0"/>
-              <a:t>‹nº›</a:t>
+              <a:t>‹#›</a:t>
             </a:fld>
             <a:endParaRPr lang="pt-BR"/>
           </a:p>
@@ -1133,7 +1138,7 @@
           <a:p>
             <a:fld id="{6B63C24D-0847-4832-A6AF-18BDDE085E2E}" type="datetimeFigureOut">
               <a:rPr lang="pt-BR" smtClean="0"/>
-              <a:t>02/11/2018</a:t>
+              <a:t>12/11/2018</a:t>
             </a:fld>
             <a:endParaRPr lang="pt-BR"/>
           </a:p>
@@ -1187,7 +1192,7 @@
           <a:p>
             <a:fld id="{C8E25968-060D-4687-BDE5-A561D11795E5}" type="slidenum">
               <a:rPr lang="pt-BR" smtClean="0"/>
-              <a:t>‹nº›</a:t>
+              <a:t>‹#›</a:t>
             </a:fld>
             <a:endParaRPr lang="pt-BR"/>
           </a:p>
@@ -1398,7 +1403,7 @@
           <a:p>
             <a:fld id="{6B63C24D-0847-4832-A6AF-18BDDE085E2E}" type="datetimeFigureOut">
               <a:rPr lang="pt-BR" smtClean="0"/>
-              <a:t>02/11/2018</a:t>
+              <a:t>12/11/2018</a:t>
             </a:fld>
             <a:endParaRPr lang="pt-BR"/>
           </a:p>
@@ -1452,7 +1457,7 @@
           <a:p>
             <a:fld id="{C8E25968-060D-4687-BDE5-A561D11795E5}" type="slidenum">
               <a:rPr lang="pt-BR" smtClean="0"/>
-              <a:t>‹nº›</a:t>
+              <a:t>‹#›</a:t>
             </a:fld>
             <a:endParaRPr lang="pt-BR"/>
           </a:p>
@@ -1810,7 +1815,7 @@
           <a:p>
             <a:fld id="{6B63C24D-0847-4832-A6AF-18BDDE085E2E}" type="datetimeFigureOut">
               <a:rPr lang="pt-BR" smtClean="0"/>
-              <a:t>02/11/2018</a:t>
+              <a:t>12/11/2018</a:t>
             </a:fld>
             <a:endParaRPr lang="pt-BR"/>
           </a:p>
@@ -1864,7 +1869,7 @@
           <a:p>
             <a:fld id="{C8E25968-060D-4687-BDE5-A561D11795E5}" type="slidenum">
               <a:rPr lang="pt-BR" smtClean="0"/>
-              <a:t>‹nº›</a:t>
+              <a:t>‹#›</a:t>
             </a:fld>
             <a:endParaRPr lang="pt-BR"/>
           </a:p>
@@ -1951,7 +1956,7 @@
           <a:p>
             <a:fld id="{6B63C24D-0847-4832-A6AF-18BDDE085E2E}" type="datetimeFigureOut">
               <a:rPr lang="pt-BR" smtClean="0"/>
-              <a:t>02/11/2018</a:t>
+              <a:t>12/11/2018</a:t>
             </a:fld>
             <a:endParaRPr lang="pt-BR"/>
           </a:p>
@@ -2005,7 +2010,7 @@
           <a:p>
             <a:fld id="{C8E25968-060D-4687-BDE5-A561D11795E5}" type="slidenum">
               <a:rPr lang="pt-BR" smtClean="0"/>
-              <a:t>‹nº›</a:t>
+              <a:t>‹#›</a:t>
             </a:fld>
             <a:endParaRPr lang="pt-BR"/>
           </a:p>
@@ -2064,7 +2069,7 @@
           <a:p>
             <a:fld id="{6B63C24D-0847-4832-A6AF-18BDDE085E2E}" type="datetimeFigureOut">
               <a:rPr lang="pt-BR" smtClean="0"/>
-              <a:t>02/11/2018</a:t>
+              <a:t>12/11/2018</a:t>
             </a:fld>
             <a:endParaRPr lang="pt-BR"/>
           </a:p>
@@ -2118,7 +2123,7 @@
           <a:p>
             <a:fld id="{C8E25968-060D-4687-BDE5-A561D11795E5}" type="slidenum">
               <a:rPr lang="pt-BR" smtClean="0"/>
-              <a:t>‹nº›</a:t>
+              <a:t>‹#›</a:t>
             </a:fld>
             <a:endParaRPr lang="pt-BR"/>
           </a:p>
@@ -2375,7 +2380,7 @@
           <a:p>
             <a:fld id="{6B63C24D-0847-4832-A6AF-18BDDE085E2E}" type="datetimeFigureOut">
               <a:rPr lang="pt-BR" smtClean="0"/>
-              <a:t>02/11/2018</a:t>
+              <a:t>12/11/2018</a:t>
             </a:fld>
             <a:endParaRPr lang="pt-BR"/>
           </a:p>
@@ -2429,7 +2434,7 @@
           <a:p>
             <a:fld id="{C8E25968-060D-4687-BDE5-A561D11795E5}" type="slidenum">
               <a:rPr lang="pt-BR" smtClean="0"/>
-              <a:t>‹nº›</a:t>
+              <a:t>‹#›</a:t>
             </a:fld>
             <a:endParaRPr lang="pt-BR"/>
           </a:p>
@@ -2663,7 +2668,7 @@
           <a:p>
             <a:fld id="{6B63C24D-0847-4832-A6AF-18BDDE085E2E}" type="datetimeFigureOut">
               <a:rPr lang="pt-BR" smtClean="0"/>
-              <a:t>02/11/2018</a:t>
+              <a:t>12/11/2018</a:t>
             </a:fld>
             <a:endParaRPr lang="pt-BR"/>
           </a:p>
@@ -2717,7 +2722,7 @@
           <a:p>
             <a:fld id="{C8E25968-060D-4687-BDE5-A561D11795E5}" type="slidenum">
               <a:rPr lang="pt-BR" smtClean="0"/>
-              <a:t>‹nº›</a:t>
+              <a:t>‹#›</a:t>
             </a:fld>
             <a:endParaRPr lang="pt-BR"/>
           </a:p>
@@ -2904,7 +2909,7 @@
           <a:p>
             <a:fld id="{6B63C24D-0847-4832-A6AF-18BDDE085E2E}" type="datetimeFigureOut">
               <a:rPr lang="pt-BR" smtClean="0"/>
-              <a:t>02/11/2018</a:t>
+              <a:t>12/11/2018</a:t>
             </a:fld>
             <a:endParaRPr lang="pt-BR"/>
           </a:p>
@@ -2994,7 +2999,7 @@
           <a:p>
             <a:fld id="{C8E25968-060D-4687-BDE5-A561D11795E5}" type="slidenum">
               <a:rPr lang="pt-BR" smtClean="0"/>
-              <a:t>‹nº›</a:t>
+              <a:t>‹#›</a:t>
             </a:fld>
             <a:endParaRPr lang="pt-BR"/>
           </a:p>
@@ -3335,7 +3340,7 @@
         </p:nvSpPr>
         <p:spPr>
           <a:xfrm>
-            <a:off x="1447060" y="1846555"/>
+            <a:off x="1440412" y="1846555"/>
             <a:ext cx="1584000" cy="540000"/>
           </a:xfrm>
           <a:prstGeom prst="rect">
@@ -3369,18 +3374,6 @@
               <a:rPr lang="pt-BR" sz="1400" b="1" dirty="0"/>
               <a:t>Extração de tweets</a:t>
             </a:r>
-          </a:p>
-          <a:p>
-            <a:pPr algn="ctr"/>
-            <a:r>
-              <a:rPr lang="pt-BR" sz="1400" b="1" dirty="0"/>
-              <a:t>@</a:t>
-            </a:r>
-            <a:r>
-              <a:rPr lang="pt-BR" sz="1400" b="1" dirty="0" err="1"/>
-              <a:t>falanext</a:t>
-            </a:r>
-            <a:endParaRPr lang="pt-BR" sz="1400" b="1" dirty="0"/>
           </a:p>
         </p:txBody>
       </p:sp>
@@ -3459,8 +3452,8 @@
         </p:nvCxnSpPr>
         <p:spPr>
           <a:xfrm>
-            <a:off x="3031060" y="2116555"/>
-            <a:ext cx="556020" cy="0"/>
+            <a:off x="3024412" y="2116555"/>
+            <a:ext cx="562668" cy="0"/>
           </a:xfrm>
           <a:prstGeom prst="straightConnector1">
             <a:avLst/>
@@ -3612,64 +3605,6 @@
         </p:nvSpPr>
         <p:spPr>
           <a:xfrm>
-            <a:off x="5727100" y="2889000"/>
-            <a:ext cx="1584000" cy="540000"/>
-          </a:xfrm>
-          <a:prstGeom prst="rect">
-            <a:avLst/>
-          </a:prstGeom>
-        </p:spPr>
-        <p:style>
-          <a:lnRef idx="2">
-            <a:schemeClr val="accent3">
-              <a:shade val="50000"/>
-            </a:schemeClr>
-          </a:lnRef>
-          <a:fillRef idx="1">
-            <a:schemeClr val="accent3"/>
-          </a:fillRef>
-          <a:effectRef idx="0">
-            <a:schemeClr val="accent3"/>
-          </a:effectRef>
-          <a:fontRef idx="minor">
-            <a:schemeClr val="lt1"/>
-          </a:fontRef>
-        </p:style>
-        <p:txBody>
-          <a:bodyPr wrap="none" rtlCol="0" anchor="ctr">
-            <a:spAutoFit/>
-          </a:bodyPr>
-          <a:lstStyle/>
-          <a:p>
-            <a:pPr algn="ctr"/>
-            <a:r>
-              <a:rPr lang="pt-BR" sz="1400" b="1" dirty="0"/>
-              <a:t>Classificação</a:t>
-            </a:r>
-          </a:p>
-          <a:p>
-            <a:pPr algn="ctr"/>
-            <a:r>
-              <a:rPr lang="pt-BR" sz="1400" b="1" dirty="0"/>
-              <a:t>de palavras</a:t>
-            </a:r>
-          </a:p>
-        </p:txBody>
-      </p:sp>
-      <p:sp>
-        <p:nvSpPr>
-          <p:cNvPr id="13" name="CaixaDeTexto 12">
-            <a:extLst>
-              <a:ext uri="{FF2B5EF4-FFF2-40B4-BE49-F238E27FC236}">
-                <a16:creationId xmlns:a16="http://schemas.microsoft.com/office/drawing/2014/main" id="{92789105-D8B0-464D-B378-F23FFA650025}"/>
-              </a:ext>
-            </a:extLst>
-          </p:cNvPr>
-          <p:cNvSpPr txBox="1"/>
-          <p:nvPr/>
-        </p:nvSpPr>
-        <p:spPr>
-          <a:xfrm>
             <a:off x="3587080" y="2889000"/>
             <a:ext cx="1584000" cy="540000"/>
           </a:xfrm>
@@ -3702,6 +3637,64 @@
             <a:pPr algn="ctr"/>
             <a:r>
               <a:rPr lang="pt-BR" sz="1400" b="1" dirty="0"/>
+              <a:t>Classificação</a:t>
+            </a:r>
+          </a:p>
+          <a:p>
+            <a:pPr algn="ctr"/>
+            <a:r>
+              <a:rPr lang="pt-BR" sz="1400" b="1" dirty="0"/>
+              <a:t>de palavras</a:t>
+            </a:r>
+          </a:p>
+        </p:txBody>
+      </p:sp>
+      <p:sp>
+        <p:nvSpPr>
+          <p:cNvPr id="13" name="CaixaDeTexto 12">
+            <a:extLst>
+              <a:ext uri="{FF2B5EF4-FFF2-40B4-BE49-F238E27FC236}">
+                <a16:creationId xmlns:a16="http://schemas.microsoft.com/office/drawing/2014/main" id="{92789105-D8B0-464D-B378-F23FFA650025}"/>
+              </a:ext>
+            </a:extLst>
+          </p:cNvPr>
+          <p:cNvSpPr txBox="1"/>
+          <p:nvPr/>
+        </p:nvSpPr>
+        <p:spPr>
+          <a:xfrm>
+            <a:off x="1440412" y="2889000"/>
+            <a:ext cx="1584000" cy="540000"/>
+          </a:xfrm>
+          <a:prstGeom prst="rect">
+            <a:avLst/>
+          </a:prstGeom>
+        </p:spPr>
+        <p:style>
+          <a:lnRef idx="2">
+            <a:schemeClr val="accent3">
+              <a:shade val="50000"/>
+            </a:schemeClr>
+          </a:lnRef>
+          <a:fillRef idx="1">
+            <a:schemeClr val="accent3"/>
+          </a:fillRef>
+          <a:effectRef idx="0">
+            <a:schemeClr val="accent3"/>
+          </a:effectRef>
+          <a:fontRef idx="minor">
+            <a:schemeClr val="lt1"/>
+          </a:fontRef>
+        </p:style>
+        <p:txBody>
+          <a:bodyPr wrap="none" rtlCol="0" anchor="ctr">
+            <a:spAutoFit/>
+          </a:bodyPr>
+          <a:lstStyle/>
+          <a:p>
+            <a:pPr algn="ctr"/>
+            <a:r>
+              <a:rPr lang="pt-BR" sz="1400" b="1" dirty="0"/>
               <a:t>Análises</a:t>
             </a:r>
           </a:p>
@@ -3720,6 +3713,55 @@
             <a:cxnSpLocks/>
             <a:stCxn id="12" idx="1"/>
             <a:endCxn id="13" idx="3"/>
+          </p:cNvCxnSpPr>
+          <p:nvPr/>
+        </p:nvCxnSpPr>
+        <p:spPr>
+          <a:xfrm flipH="1">
+            <a:off x="3024412" y="3159000"/>
+            <a:ext cx="562668" cy="0"/>
+          </a:xfrm>
+          <a:prstGeom prst="straightConnector1">
+            <a:avLst/>
+          </a:prstGeom>
+          <a:ln w="19050">
+            <a:solidFill>
+              <a:schemeClr val="tx1">
+                <a:lumMod val="50000"/>
+                <a:lumOff val="50000"/>
+              </a:schemeClr>
+            </a:solidFill>
+            <a:tailEnd type="triangle"/>
+          </a:ln>
+        </p:spPr>
+        <p:style>
+          <a:lnRef idx="1">
+            <a:schemeClr val="accent1"/>
+          </a:lnRef>
+          <a:fillRef idx="0">
+            <a:schemeClr val="accent1"/>
+          </a:fillRef>
+          <a:effectRef idx="0">
+            <a:schemeClr val="accent1"/>
+          </a:effectRef>
+          <a:fontRef idx="minor">
+            <a:schemeClr val="tx1"/>
+          </a:fontRef>
+        </p:style>
+      </p:cxnSp>
+      <p:cxnSp>
+        <p:nvCxnSpPr>
+          <p:cNvPr id="17" name="Conector de Seta Reta 16">
+            <a:extLst>
+              <a:ext uri="{FF2B5EF4-FFF2-40B4-BE49-F238E27FC236}">
+                <a16:creationId xmlns:a16="http://schemas.microsoft.com/office/drawing/2014/main" id="{6A5CF1CD-523F-4895-8475-F0C7E9146F86}"/>
+              </a:ext>
+            </a:extLst>
+          </p:cNvPr>
+          <p:cNvCxnSpPr>
+            <a:cxnSpLocks/>
+            <a:stCxn id="14" idx="1"/>
+            <a:endCxn id="12" idx="3"/>
           </p:cNvCxnSpPr>
           <p:nvPr/>
         </p:nvCxnSpPr>
@@ -3756,26 +3798,298 @@
           </a:fontRef>
         </p:style>
       </p:cxnSp>
+      <p:sp>
+        <p:nvSpPr>
+          <p:cNvPr id="11" name="CaixaDeTexto 11">
+            <a:extLst>
+              <a:ext uri="{FF2B5EF4-FFF2-40B4-BE49-F238E27FC236}">
+                <a16:creationId xmlns:a16="http://schemas.microsoft.com/office/drawing/2014/main" id="{0289EAE8-C4CB-4B6E-BB6B-703F8A07E6E4}"/>
+              </a:ext>
+            </a:extLst>
+          </p:cNvPr>
+          <p:cNvSpPr txBox="1"/>
+          <p:nvPr/>
+        </p:nvSpPr>
+        <p:spPr>
+          <a:xfrm>
+            <a:off x="7773122" y="1863335"/>
+            <a:ext cx="1601978" cy="523220"/>
+          </a:xfrm>
+          <a:prstGeom prst="rect">
+            <a:avLst/>
+          </a:prstGeom>
+        </p:spPr>
+        <p:style>
+          <a:lnRef idx="2">
+            <a:schemeClr val="accent3">
+              <a:shade val="50000"/>
+            </a:schemeClr>
+          </a:lnRef>
+          <a:fillRef idx="1">
+            <a:schemeClr val="accent3"/>
+          </a:fillRef>
+          <a:effectRef idx="0">
+            <a:schemeClr val="accent3"/>
+          </a:effectRef>
+          <a:fontRef idx="minor">
+            <a:schemeClr val="lt1"/>
+          </a:fontRef>
+        </p:style>
+        <p:txBody>
+          <a:bodyPr wrap="none" rtlCol="0" anchor="ctr">
+            <a:spAutoFit/>
+          </a:bodyPr>
+          <a:lstStyle/>
+          <a:p>
+            <a:pPr algn="ctr"/>
+            <a:r>
+              <a:rPr lang="pt-BR" sz="1400" b="1" dirty="0"/>
+              <a:t>Separação amostra</a:t>
+            </a:r>
+          </a:p>
+          <a:p>
+            <a:pPr algn="ctr"/>
+            <a:r>
+              <a:rPr lang="pt-BR" sz="1400" b="1" dirty="0"/>
+              <a:t>em learn e test</a:t>
+            </a:r>
+          </a:p>
+        </p:txBody>
+      </p:sp>
+      <p:sp>
+        <p:nvSpPr>
+          <p:cNvPr id="14" name="CaixaDeTexto 11">
+            <a:extLst>
+              <a:ext uri="{FF2B5EF4-FFF2-40B4-BE49-F238E27FC236}">
+                <a16:creationId xmlns:a16="http://schemas.microsoft.com/office/drawing/2014/main" id="{489C0404-B392-4411-9085-8806A2485E9B}"/>
+              </a:ext>
+            </a:extLst>
+          </p:cNvPr>
+          <p:cNvSpPr txBox="1"/>
+          <p:nvPr/>
+        </p:nvSpPr>
+        <p:spPr>
+          <a:xfrm>
+            <a:off x="5727100" y="2889000"/>
+            <a:ext cx="1584000" cy="540000"/>
+          </a:xfrm>
+          <a:prstGeom prst="rect">
+            <a:avLst/>
+          </a:prstGeom>
+        </p:spPr>
+        <p:style>
+          <a:lnRef idx="2">
+            <a:schemeClr val="accent3">
+              <a:shade val="50000"/>
+            </a:schemeClr>
+          </a:lnRef>
+          <a:fillRef idx="1">
+            <a:schemeClr val="accent3"/>
+          </a:fillRef>
+          <a:effectRef idx="0">
+            <a:schemeClr val="accent3"/>
+          </a:effectRef>
+          <a:fontRef idx="minor">
+            <a:schemeClr val="lt1"/>
+          </a:fontRef>
+        </p:style>
+        <p:txBody>
+          <a:bodyPr wrap="none" rtlCol="0" anchor="ctr">
+            <a:spAutoFit/>
+          </a:bodyPr>
+          <a:lstStyle/>
+          <a:p>
+            <a:pPr algn="ctr"/>
+            <a:r>
+              <a:rPr lang="pt-BR" sz="1400" b="1" dirty="0"/>
+              <a:t>Acurácia algoritmos </a:t>
+            </a:r>
+          </a:p>
+          <a:p>
+            <a:pPr algn="ctr"/>
+            <a:r>
+              <a:rPr lang="pt-BR" sz="1400" b="1" dirty="0"/>
+              <a:t>de classificação</a:t>
+            </a:r>
+          </a:p>
+        </p:txBody>
+      </p:sp>
       <p:cxnSp>
         <p:nvCxnSpPr>
-          <p:cNvPr id="17" name="Conector de Seta Reta 16">
-            <a:extLst>
-              <a:ext uri="{FF2B5EF4-FFF2-40B4-BE49-F238E27FC236}">
-                <a16:creationId xmlns:a16="http://schemas.microsoft.com/office/drawing/2014/main" id="{6A5CF1CD-523F-4895-8475-F0C7E9146F86}"/>
+          <p:cNvPr id="15" name="Conector de Seta Reta 8">
+            <a:extLst>
+              <a:ext uri="{FF2B5EF4-FFF2-40B4-BE49-F238E27FC236}">
+                <a16:creationId xmlns:a16="http://schemas.microsoft.com/office/drawing/2014/main" id="{A42A0BFF-45A1-4DBB-8C36-68A9C6304E8A}"/>
               </a:ext>
             </a:extLst>
           </p:cNvPr>
           <p:cNvCxnSpPr>
             <a:cxnSpLocks/>
-            <a:stCxn id="8" idx="2"/>
-            <a:endCxn id="12" idx="0"/>
+            <a:stCxn id="8" idx="3"/>
+            <a:endCxn id="11" idx="1"/>
           </p:cNvCxnSpPr>
           <p:nvPr/>
         </p:nvCxnSpPr>
         <p:spPr>
           <a:xfrm>
-            <a:off x="6519100" y="2386555"/>
-            <a:ext cx="0" cy="502445"/>
+            <a:off x="7311100" y="2116555"/>
+            <a:ext cx="462022" cy="8390"/>
+          </a:xfrm>
+          <a:prstGeom prst="straightConnector1">
+            <a:avLst/>
+          </a:prstGeom>
+          <a:ln w="19050">
+            <a:solidFill>
+              <a:schemeClr val="tx1">
+                <a:lumMod val="50000"/>
+                <a:lumOff val="50000"/>
+              </a:schemeClr>
+            </a:solidFill>
+            <a:tailEnd type="triangle"/>
+          </a:ln>
+        </p:spPr>
+        <p:style>
+          <a:lnRef idx="1">
+            <a:schemeClr val="accent1"/>
+          </a:lnRef>
+          <a:fillRef idx="0">
+            <a:schemeClr val="accent1"/>
+          </a:fillRef>
+          <a:effectRef idx="0">
+            <a:schemeClr val="accent1"/>
+          </a:effectRef>
+          <a:fontRef idx="minor">
+            <a:schemeClr val="tx1"/>
+          </a:fontRef>
+        </p:style>
+      </p:cxnSp>
+      <p:cxnSp>
+        <p:nvCxnSpPr>
+          <p:cNvPr id="18" name="Conector de Seta Reta 16">
+            <a:extLst>
+              <a:ext uri="{FF2B5EF4-FFF2-40B4-BE49-F238E27FC236}">
+                <a16:creationId xmlns:a16="http://schemas.microsoft.com/office/drawing/2014/main" id="{601DF166-AE1D-4734-8596-2A2BF1580611}"/>
+              </a:ext>
+            </a:extLst>
+          </p:cNvPr>
+          <p:cNvCxnSpPr>
+            <a:cxnSpLocks/>
+            <a:stCxn id="11" idx="2"/>
+            <a:endCxn id="19" idx="0"/>
+          </p:cNvCxnSpPr>
+          <p:nvPr/>
+        </p:nvCxnSpPr>
+        <p:spPr>
+          <a:xfrm flipH="1">
+            <a:off x="8565122" y="2386555"/>
+            <a:ext cx="8989" cy="494055"/>
+          </a:xfrm>
+          <a:prstGeom prst="straightConnector1">
+            <a:avLst/>
+          </a:prstGeom>
+          <a:ln w="19050">
+            <a:solidFill>
+              <a:schemeClr val="tx1">
+                <a:lumMod val="50000"/>
+                <a:lumOff val="50000"/>
+              </a:schemeClr>
+            </a:solidFill>
+            <a:tailEnd type="triangle"/>
+          </a:ln>
+        </p:spPr>
+        <p:style>
+          <a:lnRef idx="1">
+            <a:schemeClr val="accent1"/>
+          </a:lnRef>
+          <a:fillRef idx="0">
+            <a:schemeClr val="accent1"/>
+          </a:fillRef>
+          <a:effectRef idx="0">
+            <a:schemeClr val="accent1"/>
+          </a:effectRef>
+          <a:fontRef idx="minor">
+            <a:schemeClr val="tx1"/>
+          </a:fontRef>
+        </p:style>
+      </p:cxnSp>
+      <p:sp>
+        <p:nvSpPr>
+          <p:cNvPr id="19" name="CaixaDeTexto 11">
+            <a:extLst>
+              <a:ext uri="{FF2B5EF4-FFF2-40B4-BE49-F238E27FC236}">
+                <a16:creationId xmlns:a16="http://schemas.microsoft.com/office/drawing/2014/main" id="{F493F403-9D96-4BD7-995F-4537F8CD27AF}"/>
+              </a:ext>
+            </a:extLst>
+          </p:cNvPr>
+          <p:cNvSpPr txBox="1"/>
+          <p:nvPr/>
+        </p:nvSpPr>
+        <p:spPr>
+          <a:xfrm>
+            <a:off x="7773122" y="2880610"/>
+            <a:ext cx="1584000" cy="540000"/>
+          </a:xfrm>
+          <a:prstGeom prst="rect">
+            <a:avLst/>
+          </a:prstGeom>
+        </p:spPr>
+        <p:style>
+          <a:lnRef idx="2">
+            <a:schemeClr val="accent3">
+              <a:shade val="50000"/>
+            </a:schemeClr>
+          </a:lnRef>
+          <a:fillRef idx="1">
+            <a:schemeClr val="accent3"/>
+          </a:fillRef>
+          <a:effectRef idx="0">
+            <a:schemeClr val="accent3"/>
+          </a:effectRef>
+          <a:fontRef idx="minor">
+            <a:schemeClr val="lt1"/>
+          </a:fontRef>
+        </p:style>
+        <p:txBody>
+          <a:bodyPr wrap="none" rtlCol="0" anchor="ctr">
+            <a:spAutoFit/>
+          </a:bodyPr>
+          <a:lstStyle/>
+          <a:p>
+            <a:pPr algn="ctr"/>
+            <a:r>
+              <a:rPr lang="pt-BR" sz="1400" b="1" dirty="0"/>
+              <a:t>Algoritmos </a:t>
+            </a:r>
+          </a:p>
+          <a:p>
+            <a:pPr algn="ctr"/>
+            <a:r>
+              <a:rPr lang="pt-BR" sz="1400" b="1" dirty="0"/>
+              <a:t>de classificação</a:t>
+            </a:r>
+          </a:p>
+        </p:txBody>
+      </p:sp>
+      <p:cxnSp>
+        <p:nvCxnSpPr>
+          <p:cNvPr id="20" name="Conector de Seta Reta 16">
+            <a:extLst>
+              <a:ext uri="{FF2B5EF4-FFF2-40B4-BE49-F238E27FC236}">
+                <a16:creationId xmlns:a16="http://schemas.microsoft.com/office/drawing/2014/main" id="{20ED278D-F656-42AA-B46D-9DD0BB996B0E}"/>
+              </a:ext>
+            </a:extLst>
+          </p:cNvPr>
+          <p:cNvCxnSpPr>
+            <a:cxnSpLocks/>
+            <a:stCxn id="19" idx="1"/>
+            <a:endCxn id="14" idx="3"/>
+          </p:cNvCxnSpPr>
+          <p:nvPr/>
+        </p:nvCxnSpPr>
+        <p:spPr>
+          <a:xfrm flipH="1">
+            <a:off x="7311100" y="3150610"/>
+            <a:ext cx="462022" cy="8390"/>
           </a:xfrm>
           <a:prstGeom prst="straightConnector1">
             <a:avLst/>

</xml_diff>